<commit_message>
Aulas adicionadas ou atualizadas
</commit_message>
<xml_diff>
--- a/Aula 3/ComandosBásicos.pptx
+++ b/Aula 3/ComandosBásicos.pptx
@@ -118,6 +118,11 @@
       </a:defRPr>
     </a:lvl9pPr>
   </p:defaultTextStyle>
+  <p:extLst>
+    <p:ext uri="{EFAFB233-063F-42B5-8137-9DF3F51BA10A}">
+      <p15:sldGuideLst xmlns:p15="http://schemas.microsoft.com/office/powerpoint/2012/main"/>
+    </p:ext>
+  </p:extLst>
 </p:presentation>
 </file>
 
@@ -268,7 +273,7 @@
           <a:p>
             <a:fld id="{57FC07F7-71D6-4EB2-BB6B-DCE721D2C512}" type="datetimeFigureOut">
               <a:rPr lang="pt-BR" smtClean="0"/>
-              <a:t>17/07/2025</a:t>
+              <a:t>21/07/2025</a:t>
             </a:fld>
             <a:endParaRPr lang="pt-BR"/>
           </a:p>
@@ -466,7 +471,7 @@
           <a:p>
             <a:fld id="{57FC07F7-71D6-4EB2-BB6B-DCE721D2C512}" type="datetimeFigureOut">
               <a:rPr lang="pt-BR" smtClean="0"/>
-              <a:t>17/07/2025</a:t>
+              <a:t>21/07/2025</a:t>
             </a:fld>
             <a:endParaRPr lang="pt-BR"/>
           </a:p>
@@ -674,7 +679,7 @@
           <a:p>
             <a:fld id="{57FC07F7-71D6-4EB2-BB6B-DCE721D2C512}" type="datetimeFigureOut">
               <a:rPr lang="pt-BR" smtClean="0"/>
-              <a:t>17/07/2025</a:t>
+              <a:t>21/07/2025</a:t>
             </a:fld>
             <a:endParaRPr lang="pt-BR"/>
           </a:p>
@@ -872,7 +877,7 @@
           <a:p>
             <a:fld id="{57FC07F7-71D6-4EB2-BB6B-DCE721D2C512}" type="datetimeFigureOut">
               <a:rPr lang="pt-BR" smtClean="0"/>
-              <a:t>17/07/2025</a:t>
+              <a:t>21/07/2025</a:t>
             </a:fld>
             <a:endParaRPr lang="pt-BR"/>
           </a:p>
@@ -1147,7 +1152,7 @@
           <a:p>
             <a:fld id="{57FC07F7-71D6-4EB2-BB6B-DCE721D2C512}" type="datetimeFigureOut">
               <a:rPr lang="pt-BR" smtClean="0"/>
-              <a:t>17/07/2025</a:t>
+              <a:t>21/07/2025</a:t>
             </a:fld>
             <a:endParaRPr lang="pt-BR"/>
           </a:p>
@@ -1412,7 +1417,7 @@
           <a:p>
             <a:fld id="{57FC07F7-71D6-4EB2-BB6B-DCE721D2C512}" type="datetimeFigureOut">
               <a:rPr lang="pt-BR" smtClean="0"/>
-              <a:t>17/07/2025</a:t>
+              <a:t>21/07/2025</a:t>
             </a:fld>
             <a:endParaRPr lang="pt-BR"/>
           </a:p>
@@ -1824,7 +1829,7 @@
           <a:p>
             <a:fld id="{57FC07F7-71D6-4EB2-BB6B-DCE721D2C512}" type="datetimeFigureOut">
               <a:rPr lang="pt-BR" smtClean="0"/>
-              <a:t>17/07/2025</a:t>
+              <a:t>21/07/2025</a:t>
             </a:fld>
             <a:endParaRPr lang="pt-BR"/>
           </a:p>
@@ -1965,7 +1970,7 @@
           <a:p>
             <a:fld id="{57FC07F7-71D6-4EB2-BB6B-DCE721D2C512}" type="datetimeFigureOut">
               <a:rPr lang="pt-BR" smtClean="0"/>
-              <a:t>17/07/2025</a:t>
+              <a:t>21/07/2025</a:t>
             </a:fld>
             <a:endParaRPr lang="pt-BR"/>
           </a:p>
@@ -2078,7 +2083,7 @@
           <a:p>
             <a:fld id="{57FC07F7-71D6-4EB2-BB6B-DCE721D2C512}" type="datetimeFigureOut">
               <a:rPr lang="pt-BR" smtClean="0"/>
-              <a:t>17/07/2025</a:t>
+              <a:t>21/07/2025</a:t>
             </a:fld>
             <a:endParaRPr lang="pt-BR"/>
           </a:p>
@@ -2389,7 +2394,7 @@
           <a:p>
             <a:fld id="{57FC07F7-71D6-4EB2-BB6B-DCE721D2C512}" type="datetimeFigureOut">
               <a:rPr lang="pt-BR" smtClean="0"/>
-              <a:t>17/07/2025</a:t>
+              <a:t>21/07/2025</a:t>
             </a:fld>
             <a:endParaRPr lang="pt-BR"/>
           </a:p>
@@ -2677,7 +2682,7 @@
           <a:p>
             <a:fld id="{57FC07F7-71D6-4EB2-BB6B-DCE721D2C512}" type="datetimeFigureOut">
               <a:rPr lang="pt-BR" smtClean="0"/>
-              <a:t>17/07/2025</a:t>
+              <a:t>21/07/2025</a:t>
             </a:fld>
             <a:endParaRPr lang="pt-BR"/>
           </a:p>
@@ -2918,7 +2923,7 @@
           <a:p>
             <a:fld id="{57FC07F7-71D6-4EB2-BB6B-DCE721D2C512}" type="datetimeFigureOut">
               <a:rPr lang="pt-BR" smtClean="0"/>
-              <a:t>17/07/2025</a:t>
+              <a:t>21/07/2025</a:t>
             </a:fld>
             <a:endParaRPr lang="pt-BR"/>
           </a:p>
@@ -5354,63 +5359,6 @@
           </a:p>
         </p:txBody>
       </p:sp>
-      <p:sp>
-        <p:nvSpPr>
-          <p:cNvPr id="8" name="Sinal de Multiplicação 7">
-            <a:extLst>
-              <a:ext uri="{FF2B5EF4-FFF2-40B4-BE49-F238E27FC236}">
-                <a16:creationId xmlns:a16="http://schemas.microsoft.com/office/drawing/2014/main" id="{78F0B293-17B0-2D93-BB81-2F7E1546A7DB}"/>
-              </a:ext>
-            </a:extLst>
-          </p:cNvPr>
-          <p:cNvSpPr/>
-          <p:nvPr/>
-        </p:nvSpPr>
-        <p:spPr>
-          <a:xfrm>
-            <a:off x="3103685" y="3288322"/>
-            <a:ext cx="474785" cy="281354"/>
-          </a:xfrm>
-          <a:prstGeom prst="mathMultiply">
-            <a:avLst/>
-          </a:prstGeom>
-        </p:spPr>
-        <p:style>
-          <a:lnRef idx="3">
-            <a:schemeClr val="lt1"/>
-          </a:lnRef>
-          <a:fillRef idx="1">
-            <a:schemeClr val="accent2"/>
-          </a:fillRef>
-          <a:effectRef idx="1">
-            <a:schemeClr val="accent2"/>
-          </a:effectRef>
-          <a:fontRef idx="minor">
-            <a:schemeClr val="lt1"/>
-          </a:fontRef>
-        </p:style>
-        <p:txBody>
-          <a:bodyPr rtlCol="0" anchor="ctr"/>
-          <a:lstStyle/>
-          <a:p>
-            <a:pPr algn="ctr"/>
-            <a:endParaRPr lang="pt-BR" b="1">
-              <a:ln w="22225">
-                <a:solidFill>
-                  <a:schemeClr val="accent2"/>
-                </a:solidFill>
-                <a:prstDash val="solid"/>
-              </a:ln>
-              <a:solidFill>
-                <a:schemeClr val="accent2">
-                  <a:lumMod val="40000"/>
-                  <a:lumOff val="60000"/>
-                </a:schemeClr>
-              </a:solidFill>
-            </a:endParaRPr>
-          </a:p>
-        </p:txBody>
-      </p:sp>
     </p:spTree>
     <p:extLst>
       <p:ext uri="{BB962C8B-B14F-4D97-AF65-F5344CB8AC3E}">

</xml_diff>

<commit_message>
feat: add bigger font to Aulas
</commit_message>
<xml_diff>
--- a/Aula 3/ComandosBásicos.pptx
+++ b/Aula 3/ComandosBásicos.pptx
@@ -273,7 +273,7 @@
           <a:p>
             <a:fld id="{57FC07F7-71D6-4EB2-BB6B-DCE721D2C512}" type="datetimeFigureOut">
               <a:rPr lang="pt-BR" smtClean="0"/>
-              <a:t>21/07/2025</a:t>
+              <a:t>10/02/2026</a:t>
             </a:fld>
             <a:endParaRPr lang="pt-BR"/>
           </a:p>
@@ -471,7 +471,7 @@
           <a:p>
             <a:fld id="{57FC07F7-71D6-4EB2-BB6B-DCE721D2C512}" type="datetimeFigureOut">
               <a:rPr lang="pt-BR" smtClean="0"/>
-              <a:t>21/07/2025</a:t>
+              <a:t>10/02/2026</a:t>
             </a:fld>
             <a:endParaRPr lang="pt-BR"/>
           </a:p>
@@ -679,7 +679,7 @@
           <a:p>
             <a:fld id="{57FC07F7-71D6-4EB2-BB6B-DCE721D2C512}" type="datetimeFigureOut">
               <a:rPr lang="pt-BR" smtClean="0"/>
-              <a:t>21/07/2025</a:t>
+              <a:t>10/02/2026</a:t>
             </a:fld>
             <a:endParaRPr lang="pt-BR"/>
           </a:p>
@@ -877,7 +877,7 @@
           <a:p>
             <a:fld id="{57FC07F7-71D6-4EB2-BB6B-DCE721D2C512}" type="datetimeFigureOut">
               <a:rPr lang="pt-BR" smtClean="0"/>
-              <a:t>21/07/2025</a:t>
+              <a:t>10/02/2026</a:t>
             </a:fld>
             <a:endParaRPr lang="pt-BR"/>
           </a:p>
@@ -1152,7 +1152,7 @@
           <a:p>
             <a:fld id="{57FC07F7-71D6-4EB2-BB6B-DCE721D2C512}" type="datetimeFigureOut">
               <a:rPr lang="pt-BR" smtClean="0"/>
-              <a:t>21/07/2025</a:t>
+              <a:t>10/02/2026</a:t>
             </a:fld>
             <a:endParaRPr lang="pt-BR"/>
           </a:p>
@@ -1417,7 +1417,7 @@
           <a:p>
             <a:fld id="{57FC07F7-71D6-4EB2-BB6B-DCE721D2C512}" type="datetimeFigureOut">
               <a:rPr lang="pt-BR" smtClean="0"/>
-              <a:t>21/07/2025</a:t>
+              <a:t>10/02/2026</a:t>
             </a:fld>
             <a:endParaRPr lang="pt-BR"/>
           </a:p>
@@ -1829,7 +1829,7 @@
           <a:p>
             <a:fld id="{57FC07F7-71D6-4EB2-BB6B-DCE721D2C512}" type="datetimeFigureOut">
               <a:rPr lang="pt-BR" smtClean="0"/>
-              <a:t>21/07/2025</a:t>
+              <a:t>10/02/2026</a:t>
             </a:fld>
             <a:endParaRPr lang="pt-BR"/>
           </a:p>
@@ -1970,7 +1970,7 @@
           <a:p>
             <a:fld id="{57FC07F7-71D6-4EB2-BB6B-DCE721D2C512}" type="datetimeFigureOut">
               <a:rPr lang="pt-BR" smtClean="0"/>
-              <a:t>21/07/2025</a:t>
+              <a:t>10/02/2026</a:t>
             </a:fld>
             <a:endParaRPr lang="pt-BR"/>
           </a:p>
@@ -2083,7 +2083,7 @@
           <a:p>
             <a:fld id="{57FC07F7-71D6-4EB2-BB6B-DCE721D2C512}" type="datetimeFigureOut">
               <a:rPr lang="pt-BR" smtClean="0"/>
-              <a:t>21/07/2025</a:t>
+              <a:t>10/02/2026</a:t>
             </a:fld>
             <a:endParaRPr lang="pt-BR"/>
           </a:p>
@@ -2394,7 +2394,7 @@
           <a:p>
             <a:fld id="{57FC07F7-71D6-4EB2-BB6B-DCE721D2C512}" type="datetimeFigureOut">
               <a:rPr lang="pt-BR" smtClean="0"/>
-              <a:t>21/07/2025</a:t>
+              <a:t>10/02/2026</a:t>
             </a:fld>
             <a:endParaRPr lang="pt-BR"/>
           </a:p>
@@ -2682,7 +2682,7 @@
           <a:p>
             <a:fld id="{57FC07F7-71D6-4EB2-BB6B-DCE721D2C512}" type="datetimeFigureOut">
               <a:rPr lang="pt-BR" smtClean="0"/>
-              <a:t>21/07/2025</a:t>
+              <a:t>10/02/2026</a:t>
             </a:fld>
             <a:endParaRPr lang="pt-BR"/>
           </a:p>
@@ -2923,7 +2923,7 @@
           <a:p>
             <a:fld id="{57FC07F7-71D6-4EB2-BB6B-DCE721D2C512}" type="datetimeFigureOut">
               <a:rPr lang="pt-BR" smtClean="0"/>
-              <a:t>21/07/2025</a:t>
+              <a:t>10/02/2026</a:t>
             </a:fld>
             <a:endParaRPr lang="pt-BR"/>
           </a:p>
@@ -3661,8 +3661,8 @@
         </p:nvSpPr>
         <p:spPr>
           <a:xfrm>
-            <a:off x="1895473" y="1345224"/>
-            <a:ext cx="8401052" cy="461665"/>
+            <a:off x="1219254" y="1357243"/>
+            <a:ext cx="9753490" cy="523220"/>
           </a:xfrm>
           <a:prstGeom prst="rect">
             <a:avLst/>
@@ -3676,55 +3676,55 @@
           <a:lstStyle/>
           <a:p>
             <a:r>
-              <a:rPr lang="en-US" sz="2400" dirty="0" err="1"/>
+              <a:rPr lang="en-US" sz="2800" dirty="0" err="1"/>
               <a:t>Buscando</a:t>
             </a:r>
             <a:r>
-              <a:rPr lang="en-US" sz="2400" dirty="0"/>
+              <a:rPr lang="en-US" sz="2800" dirty="0"/>
               <a:t> </a:t>
             </a:r>
             <a:r>
-              <a:rPr lang="en-US" sz="2400" dirty="0" err="1"/>
+              <a:rPr lang="en-US" sz="2800" dirty="0" err="1"/>
               <a:t>parte</a:t>
             </a:r>
             <a:r>
-              <a:rPr lang="en-US" sz="2400" dirty="0"/>
+              <a:rPr lang="en-US" sz="2800" dirty="0"/>
               <a:t> dos dados de </a:t>
             </a:r>
             <a:r>
-              <a:rPr lang="en-US" sz="2400" dirty="0" err="1"/>
+              <a:rPr lang="en-US" sz="2800" dirty="0" err="1"/>
               <a:t>uma</a:t>
             </a:r>
             <a:r>
-              <a:rPr lang="en-US" sz="2400" dirty="0"/>
+              <a:rPr lang="en-US" sz="2800" dirty="0"/>
               <a:t> </a:t>
             </a:r>
             <a:r>
-              <a:rPr lang="en-US" sz="2400" dirty="0" err="1"/>
+              <a:rPr lang="en-US" sz="2800" dirty="0" err="1"/>
               <a:t>tabela</a:t>
             </a:r>
             <a:r>
-              <a:rPr lang="en-US" sz="2400" dirty="0"/>
+              <a:rPr lang="en-US" sz="2800" dirty="0"/>
               <a:t> com </a:t>
             </a:r>
             <a:r>
-              <a:rPr lang="en-US" sz="2400" dirty="0" err="1"/>
+              <a:rPr lang="en-US" sz="2800" dirty="0" err="1"/>
               <a:t>lógicas</a:t>
             </a:r>
             <a:r>
-              <a:rPr lang="en-US" sz="2400" dirty="0"/>
+              <a:rPr lang="en-US" sz="2800" dirty="0"/>
               <a:t> AND  e NOT</a:t>
             </a:r>
-            <a:endParaRPr lang="pt-BR" sz="2400" dirty="0"/>
+            <a:endParaRPr lang="pt-BR" sz="2800" dirty="0"/>
           </a:p>
         </p:txBody>
       </p:sp>
       <p:pic>
         <p:nvPicPr>
-          <p:cNvPr id="6" name="Imagem 5">
-            <a:extLst>
-              <a:ext uri="{FF2B5EF4-FFF2-40B4-BE49-F238E27FC236}">
-                <a16:creationId xmlns:a16="http://schemas.microsoft.com/office/drawing/2014/main" id="{5C5E1A49-2DEA-0A0A-FC92-A6D7F6786773}"/>
+          <p:cNvPr id="8" name="Imagem 7">
+            <a:extLst>
+              <a:ext uri="{FF2B5EF4-FFF2-40B4-BE49-F238E27FC236}">
+                <a16:creationId xmlns:a16="http://schemas.microsoft.com/office/drawing/2014/main" id="{E3F8BF76-53CD-DBCF-D929-8A0D3775223E}"/>
               </a:ext>
             </a:extLst>
           </p:cNvPr>
@@ -3741,8 +3741,8 @@
         </p:blipFill>
         <p:spPr>
           <a:xfrm>
-            <a:off x="543036" y="2477257"/>
-            <a:ext cx="11105927" cy="385785"/>
+            <a:off x="2087026" y="3533410"/>
+            <a:ext cx="8017947" cy="1836172"/>
           </a:xfrm>
           <a:prstGeom prst="rect">
             <a:avLst/>
@@ -3751,10 +3751,10 @@
       </p:pic>
       <p:pic>
         <p:nvPicPr>
-          <p:cNvPr id="8" name="Imagem 7">
-            <a:extLst>
-              <a:ext uri="{FF2B5EF4-FFF2-40B4-BE49-F238E27FC236}">
-                <a16:creationId xmlns:a16="http://schemas.microsoft.com/office/drawing/2014/main" id="{E3F8BF76-53CD-DBCF-D929-8A0D3775223E}"/>
+          <p:cNvPr id="7" name="Imagem 6">
+            <a:extLst>
+              <a:ext uri="{FF2B5EF4-FFF2-40B4-BE49-F238E27FC236}">
+                <a16:creationId xmlns:a16="http://schemas.microsoft.com/office/drawing/2014/main" id="{B15B4459-04C1-221D-FE68-00E916DD24A4}"/>
               </a:ext>
             </a:extLst>
           </p:cNvPr>
@@ -3771,8 +3771,8 @@
         </p:blipFill>
         <p:spPr>
           <a:xfrm>
-            <a:off x="2087026" y="3533410"/>
-            <a:ext cx="8017947" cy="1836172"/>
+            <a:off x="627886" y="2529231"/>
+            <a:ext cx="10936226" cy="390580"/>
           </a:xfrm>
           <a:prstGeom prst="rect">
             <a:avLst/>
@@ -3901,8 +3901,8 @@
         </p:nvSpPr>
         <p:spPr>
           <a:xfrm>
-            <a:off x="2304681" y="1345224"/>
-            <a:ext cx="7582635" cy="461665"/>
+            <a:off x="1721318" y="1286399"/>
+            <a:ext cx="8749359" cy="523220"/>
           </a:xfrm>
           <a:prstGeom prst="rect">
             <a:avLst/>
@@ -3916,58 +3916,58 @@
           <a:lstStyle/>
           <a:p>
             <a:r>
-              <a:rPr lang="en-US" sz="2400" dirty="0" err="1"/>
+              <a:rPr lang="en-US" sz="2800" dirty="0" err="1"/>
               <a:t>Buscando</a:t>
             </a:r>
             <a:r>
-              <a:rPr lang="en-US" sz="2400" dirty="0"/>
+              <a:rPr lang="en-US" sz="2800" dirty="0"/>
               <a:t> </a:t>
             </a:r>
             <a:r>
-              <a:rPr lang="en-US" sz="2400" dirty="0" err="1"/>
+              <a:rPr lang="en-US" sz="2800" dirty="0" err="1"/>
               <a:t>todos</a:t>
             </a:r>
             <a:r>
-              <a:rPr lang="en-US" sz="2400" dirty="0"/>
+              <a:rPr lang="en-US" sz="2800" dirty="0"/>
               <a:t> </a:t>
             </a:r>
             <a:r>
-              <a:rPr lang="en-US" sz="2400" dirty="0" err="1"/>
+              <a:rPr lang="en-US" sz="2800" dirty="0" err="1"/>
               <a:t>os</a:t>
             </a:r>
             <a:r>
-              <a:rPr lang="en-US" sz="2400" dirty="0"/>
+              <a:rPr lang="en-US" sz="2800" dirty="0"/>
               <a:t> dados de </a:t>
             </a:r>
             <a:r>
-              <a:rPr lang="en-US" sz="2400" dirty="0" err="1"/>
+              <a:rPr lang="en-US" sz="2800" dirty="0" err="1"/>
               <a:t>uma</a:t>
             </a:r>
             <a:r>
-              <a:rPr lang="en-US" sz="2400" dirty="0"/>
+              <a:rPr lang="en-US" sz="2800" dirty="0"/>
               <a:t> </a:t>
             </a:r>
             <a:r>
-              <a:rPr lang="en-US" sz="2400" dirty="0" err="1"/>
+              <a:rPr lang="en-US" sz="2800" dirty="0" err="1"/>
               <a:t>tabela</a:t>
             </a:r>
             <a:r>
-              <a:rPr lang="en-US" sz="2400" dirty="0"/>
+              <a:rPr lang="en-US" sz="2800" dirty="0"/>
               <a:t> com </a:t>
             </a:r>
             <a:r>
-              <a:rPr lang="en-US" sz="2400" dirty="0" err="1"/>
+              <a:rPr lang="en-US" sz="2800" dirty="0" err="1"/>
               <a:t>filtro</a:t>
             </a:r>
             <a:r>
-              <a:rPr lang="en-US" sz="2400" dirty="0"/>
+              <a:rPr lang="en-US" sz="2800" dirty="0"/>
               <a:t> de </a:t>
             </a:r>
             <a:r>
-              <a:rPr lang="en-US" sz="2400" dirty="0" err="1"/>
+              <a:rPr lang="en-US" sz="2800" dirty="0" err="1"/>
               <a:t>texto</a:t>
             </a:r>
-            <a:endParaRPr lang="pt-BR" sz="2400" dirty="0"/>
+            <a:endParaRPr lang="pt-BR" sz="2800" dirty="0"/>
           </a:p>
         </p:txBody>
       </p:sp>
@@ -3993,8 +3993,8 @@
         </p:blipFill>
         <p:spPr>
           <a:xfrm>
-            <a:off x="1771044" y="2308186"/>
-            <a:ext cx="8649907" cy="1066949"/>
+            <a:off x="399620" y="2112741"/>
+            <a:ext cx="11392756" cy="1844061"/>
           </a:xfrm>
           <a:prstGeom prst="rect">
             <a:avLst/>
@@ -4023,7 +4023,7 @@
         </p:blipFill>
         <p:spPr>
           <a:xfrm>
-            <a:off x="609249" y="3603689"/>
+            <a:off x="697171" y="4420420"/>
             <a:ext cx="5029902" cy="828791"/>
           </a:xfrm>
           <a:prstGeom prst="rect">
@@ -4053,7 +4053,7 @@
         </p:blipFill>
         <p:spPr>
           <a:xfrm>
-            <a:off x="6600677" y="3603689"/>
+            <a:off x="6424244" y="4420420"/>
             <a:ext cx="4629796" cy="628738"/>
           </a:xfrm>
           <a:prstGeom prst="rect">
@@ -4083,8 +4083,8 @@
         </p:blipFill>
         <p:spPr>
           <a:xfrm>
-            <a:off x="871223" y="5410578"/>
-            <a:ext cx="4505954" cy="428685"/>
+            <a:off x="697171" y="5709268"/>
+            <a:ext cx="4643513" cy="441772"/>
           </a:xfrm>
           <a:prstGeom prst="rect">
             <a:avLst/>
@@ -4113,7 +4113,7 @@
         </p:blipFill>
         <p:spPr>
           <a:xfrm>
-            <a:off x="6419676" y="5200999"/>
+            <a:off x="6288689" y="5512776"/>
             <a:ext cx="4991797" cy="638264"/>
           </a:xfrm>
           <a:prstGeom prst="rect">
@@ -4243,8 +4243,8 @@
         </p:nvSpPr>
         <p:spPr>
           <a:xfrm>
-            <a:off x="2768658" y="1336431"/>
-            <a:ext cx="6654681" cy="461665"/>
+            <a:off x="2226924" y="1336431"/>
+            <a:ext cx="7738150" cy="523220"/>
           </a:xfrm>
           <a:prstGeom prst="rect">
             <a:avLst/>
@@ -4258,51 +4258,51 @@
           <a:lstStyle/>
           <a:p>
             <a:r>
-              <a:rPr lang="en-US" sz="2400" dirty="0" err="1"/>
+              <a:rPr lang="en-US" sz="2800" dirty="0" err="1"/>
               <a:t>Buscando</a:t>
             </a:r>
             <a:r>
-              <a:rPr lang="en-US" sz="2400" dirty="0"/>
+              <a:rPr lang="en-US" sz="2800" dirty="0"/>
               <a:t> </a:t>
             </a:r>
             <a:r>
-              <a:rPr lang="en-US" sz="2400" dirty="0" err="1"/>
+              <a:rPr lang="en-US" sz="2800" dirty="0" err="1"/>
               <a:t>parte</a:t>
             </a:r>
             <a:r>
-              <a:rPr lang="en-US" sz="2400" dirty="0"/>
+              <a:rPr lang="en-US" sz="2800" dirty="0"/>
               <a:t> dos dados de </a:t>
             </a:r>
             <a:r>
-              <a:rPr lang="en-US" sz="2400" dirty="0" err="1"/>
+              <a:rPr lang="en-US" sz="2800" dirty="0" err="1"/>
               <a:t>uma</a:t>
             </a:r>
             <a:r>
-              <a:rPr lang="en-US" sz="2400" dirty="0"/>
+              <a:rPr lang="en-US" sz="2800" dirty="0"/>
               <a:t> </a:t>
             </a:r>
             <a:r>
-              <a:rPr lang="en-US" sz="2400" dirty="0" err="1"/>
+              <a:rPr lang="en-US" sz="2800" dirty="0" err="1"/>
               <a:t>tabela</a:t>
             </a:r>
             <a:r>
-              <a:rPr lang="en-US" sz="2400" dirty="0"/>
+              <a:rPr lang="en-US" sz="2800" dirty="0"/>
               <a:t> com </a:t>
             </a:r>
             <a:r>
-              <a:rPr lang="en-US" sz="2400" dirty="0" err="1"/>
+              <a:rPr lang="en-US" sz="2800" dirty="0" err="1"/>
               <a:t>limite</a:t>
             </a:r>
-            <a:endParaRPr lang="pt-BR" sz="2400" dirty="0"/>
+            <a:endParaRPr lang="pt-BR" sz="2800" dirty="0"/>
           </a:p>
         </p:txBody>
       </p:sp>
       <p:pic>
         <p:nvPicPr>
-          <p:cNvPr id="7" name="Imagem 6">
-            <a:extLst>
-              <a:ext uri="{FF2B5EF4-FFF2-40B4-BE49-F238E27FC236}">
-                <a16:creationId xmlns:a16="http://schemas.microsoft.com/office/drawing/2014/main" id="{EA304C09-0C36-5665-421E-623309FEBA45}"/>
+          <p:cNvPr id="9" name="Imagem 8">
+            <a:extLst>
+              <a:ext uri="{FF2B5EF4-FFF2-40B4-BE49-F238E27FC236}">
+                <a16:creationId xmlns:a16="http://schemas.microsoft.com/office/drawing/2014/main" id="{1D6A0510-702D-1974-7907-B1F56EAAD521}"/>
               </a:ext>
             </a:extLst>
           </p:cNvPr>
@@ -4319,8 +4319,8 @@
         </p:blipFill>
         <p:spPr>
           <a:xfrm>
-            <a:off x="3130220" y="2061660"/>
-            <a:ext cx="5931559" cy="756274"/>
+            <a:off x="2839670" y="3429000"/>
+            <a:ext cx="6512657" cy="2139874"/>
           </a:xfrm>
           <a:prstGeom prst="rect">
             <a:avLst/>
@@ -4329,10 +4329,10 @@
       </p:pic>
       <p:pic>
         <p:nvPicPr>
-          <p:cNvPr id="9" name="Imagem 8">
-            <a:extLst>
-              <a:ext uri="{FF2B5EF4-FFF2-40B4-BE49-F238E27FC236}">
-                <a16:creationId xmlns:a16="http://schemas.microsoft.com/office/drawing/2014/main" id="{1D6A0510-702D-1974-7907-B1F56EAAD521}"/>
+          <p:cNvPr id="6" name="Imagem 5">
+            <a:extLst>
+              <a:ext uri="{FF2B5EF4-FFF2-40B4-BE49-F238E27FC236}">
+                <a16:creationId xmlns:a16="http://schemas.microsoft.com/office/drawing/2014/main" id="{2CE24881-FE20-794E-4B73-7D8E9B358D6A}"/>
               </a:ext>
             </a:extLst>
           </p:cNvPr>
@@ -4349,8 +4349,8 @@
         </p:blipFill>
         <p:spPr>
           <a:xfrm>
-            <a:off x="2839671" y="3381695"/>
-            <a:ext cx="6512657" cy="2139874"/>
+            <a:off x="1029492" y="2310850"/>
+            <a:ext cx="10133014" cy="619645"/>
           </a:xfrm>
           <a:prstGeom prst="rect">
             <a:avLst/>
@@ -4479,8 +4479,8 @@
         </p:nvSpPr>
         <p:spPr>
           <a:xfrm>
-            <a:off x="3453451" y="1327638"/>
-            <a:ext cx="5285096" cy="461665"/>
+            <a:off x="3005208" y="1296860"/>
+            <a:ext cx="6181578" cy="523220"/>
           </a:xfrm>
           <a:prstGeom prst="rect">
             <a:avLst/>
@@ -4494,51 +4494,51 @@
           <a:lstStyle/>
           <a:p>
             <a:r>
-              <a:rPr lang="en-US" sz="2400" dirty="0" err="1"/>
+              <a:rPr lang="en-US" sz="2800" dirty="0" err="1"/>
               <a:t>Buscando</a:t>
             </a:r>
             <a:r>
-              <a:rPr lang="en-US" sz="2400" dirty="0"/>
+              <a:rPr lang="en-US" sz="2800" dirty="0"/>
               <a:t> </a:t>
             </a:r>
             <a:r>
-              <a:rPr lang="en-US" sz="2400" dirty="0" err="1"/>
+              <a:rPr lang="en-US" sz="2800" dirty="0" err="1"/>
               <a:t>todos</a:t>
             </a:r>
             <a:r>
-              <a:rPr lang="en-US" sz="2400" dirty="0"/>
+              <a:rPr lang="en-US" sz="2800" dirty="0"/>
               <a:t> </a:t>
             </a:r>
             <a:r>
-              <a:rPr lang="en-US" sz="2400" dirty="0" err="1"/>
+              <a:rPr lang="en-US" sz="2800" dirty="0" err="1"/>
               <a:t>os</a:t>
             </a:r>
             <a:r>
-              <a:rPr lang="en-US" sz="2400" dirty="0"/>
+              <a:rPr lang="en-US" sz="2800" dirty="0"/>
               <a:t> dados </a:t>
             </a:r>
             <a:r>
-              <a:rPr lang="en-US" sz="2400" dirty="0" err="1"/>
+              <a:rPr lang="en-US" sz="2800" dirty="0" err="1"/>
               <a:t>sem</a:t>
             </a:r>
             <a:r>
-              <a:rPr lang="en-US" sz="2400" dirty="0"/>
+              <a:rPr lang="en-US" sz="2800" dirty="0"/>
               <a:t> </a:t>
             </a:r>
             <a:r>
-              <a:rPr lang="en-US" sz="2400" dirty="0" err="1"/>
+              <a:rPr lang="en-US" sz="2800" dirty="0" err="1"/>
               <a:t>repetições</a:t>
             </a:r>
-            <a:endParaRPr lang="pt-BR" sz="2400" dirty="0"/>
+            <a:endParaRPr lang="pt-BR" sz="2800" dirty="0"/>
           </a:p>
         </p:txBody>
       </p:sp>
       <p:pic>
         <p:nvPicPr>
-          <p:cNvPr id="6" name="Imagem 5">
-            <a:extLst>
-              <a:ext uri="{FF2B5EF4-FFF2-40B4-BE49-F238E27FC236}">
-                <a16:creationId xmlns:a16="http://schemas.microsoft.com/office/drawing/2014/main" id="{54FE6408-76BE-2D32-B372-0D62A7D399FF}"/>
+          <p:cNvPr id="8" name="Imagem 7">
+            <a:extLst>
+              <a:ext uri="{FF2B5EF4-FFF2-40B4-BE49-F238E27FC236}">
+                <a16:creationId xmlns:a16="http://schemas.microsoft.com/office/drawing/2014/main" id="{CB5AEB9F-C1E9-A1CA-A981-AA5E6A0C2897}"/>
               </a:ext>
             </a:extLst>
           </p:cNvPr>
@@ -4555,8 +4555,8 @@
         </p:blipFill>
         <p:spPr>
           <a:xfrm>
-            <a:off x="2468161" y="2153980"/>
-            <a:ext cx="7255678" cy="826342"/>
+            <a:off x="5131746" y="3429000"/>
+            <a:ext cx="1928505" cy="2914673"/>
           </a:xfrm>
           <a:prstGeom prst="rect">
             <a:avLst/>
@@ -4565,10 +4565,10 @@
       </p:pic>
       <p:pic>
         <p:nvPicPr>
-          <p:cNvPr id="8" name="Imagem 7">
-            <a:extLst>
-              <a:ext uri="{FF2B5EF4-FFF2-40B4-BE49-F238E27FC236}">
-                <a16:creationId xmlns:a16="http://schemas.microsoft.com/office/drawing/2014/main" id="{CB5AEB9F-C1E9-A1CA-A981-AA5E6A0C2897}"/>
+          <p:cNvPr id="7" name="Imagem 6">
+            <a:extLst>
+              <a:ext uri="{FF2B5EF4-FFF2-40B4-BE49-F238E27FC236}">
+                <a16:creationId xmlns:a16="http://schemas.microsoft.com/office/drawing/2014/main" id="{D300F50E-7063-64DB-C6BB-7E789C8852C1}"/>
               </a:ext>
             </a:extLst>
           </p:cNvPr>
@@ -4585,8 +4585,8 @@
         </p:blipFill>
         <p:spPr>
           <a:xfrm>
-            <a:off x="5131746" y="3429000"/>
-            <a:ext cx="1928505" cy="2914673"/>
+            <a:off x="1197810" y="2248770"/>
+            <a:ext cx="9796373" cy="751539"/>
           </a:xfrm>
           <a:prstGeom prst="rect">
             <a:avLst/>
@@ -4715,8 +4715,8 @@
         </p:nvSpPr>
         <p:spPr>
           <a:xfrm>
-            <a:off x="3149613" y="1327638"/>
-            <a:ext cx="5892772" cy="461665"/>
+            <a:off x="2830847" y="1288478"/>
+            <a:ext cx="6530304" cy="523220"/>
           </a:xfrm>
           <a:prstGeom prst="rect">
             <a:avLst/>
@@ -4730,42 +4730,42 @@
           <a:lstStyle/>
           <a:p>
             <a:r>
-              <a:rPr lang="en-US" sz="2400" dirty="0" err="1"/>
+              <a:rPr lang="en-US" sz="2800" dirty="0" err="1"/>
               <a:t>Buscando</a:t>
             </a:r>
             <a:r>
-              <a:rPr lang="en-US" sz="2400" dirty="0"/>
+              <a:rPr lang="en-US" sz="2800" dirty="0"/>
               <a:t> </a:t>
             </a:r>
             <a:r>
-              <a:rPr lang="en-US" sz="2400" dirty="0" err="1"/>
+              <a:rPr lang="en-US" sz="2800" dirty="0" err="1"/>
               <a:t>valores</a:t>
             </a:r>
             <a:r>
-              <a:rPr lang="en-US" sz="2400" dirty="0"/>
+              <a:rPr lang="en-US" sz="2800" dirty="0"/>
               <a:t> </a:t>
             </a:r>
             <a:r>
-              <a:rPr lang="en-US" sz="2400" dirty="0" err="1"/>
+              <a:rPr lang="en-US" sz="2800" dirty="0" err="1"/>
               <a:t>usando</a:t>
             </a:r>
             <a:r>
-              <a:rPr lang="en-US" sz="2400" dirty="0"/>
+              <a:rPr lang="en-US" sz="2800" dirty="0"/>
               <a:t> </a:t>
             </a:r>
             <a:r>
-              <a:rPr lang="en-US" sz="2400" dirty="0" err="1"/>
+              <a:rPr lang="en-US" sz="2800" dirty="0" err="1"/>
               <a:t>funções</a:t>
             </a:r>
             <a:r>
-              <a:rPr lang="en-US" sz="2400" dirty="0"/>
+              <a:rPr lang="en-US" sz="2800" dirty="0"/>
               <a:t> </a:t>
             </a:r>
             <a:r>
-              <a:rPr lang="en-US" sz="2400" dirty="0" err="1"/>
+              <a:rPr lang="en-US" sz="2800" dirty="0" err="1"/>
               <a:t>auxiliares</a:t>
             </a:r>
-            <a:endParaRPr lang="pt-BR" sz="2400" dirty="0"/>
+            <a:endParaRPr lang="pt-BR" sz="2800" dirty="0"/>
           </a:p>
         </p:txBody>
       </p:sp>
@@ -5840,8 +5840,8 @@
         </p:nvSpPr>
         <p:spPr>
           <a:xfrm>
-            <a:off x="3659429" y="1362908"/>
-            <a:ext cx="4873137" cy="461665"/>
+            <a:off x="3305355" y="1314075"/>
+            <a:ext cx="5581286" cy="523220"/>
           </a:xfrm>
           <a:prstGeom prst="rect">
             <a:avLst/>
@@ -5855,7 +5855,7 @@
           <a:lstStyle/>
           <a:p>
             <a:r>
-              <a:rPr lang="en-US" sz="2400" dirty="0">
+              <a:rPr lang="en-US" sz="2800" dirty="0">
                 <a:solidFill>
                   <a:srgbClr val="7030A0"/>
                 </a:solidFill>
@@ -5863,11 +5863,11 @@
               <a:t>INSERT</a:t>
             </a:r>
             <a:r>
-              <a:rPr lang="en-US" sz="2400" dirty="0"/>
+              <a:rPr lang="en-US" sz="2800" dirty="0"/>
               <a:t> </a:t>
             </a:r>
             <a:r>
-              <a:rPr lang="en-US" sz="2400" dirty="0">
+              <a:rPr lang="en-US" sz="2800" dirty="0">
                 <a:solidFill>
                   <a:srgbClr val="7030A0"/>
                 </a:solidFill>
@@ -5875,19 +5875,19 @@
               <a:t>INTO</a:t>
             </a:r>
             <a:r>
-              <a:rPr lang="en-US" sz="2400" dirty="0"/>
+              <a:rPr lang="en-US" sz="2800" dirty="0"/>
               <a:t> </a:t>
             </a:r>
             <a:r>
-              <a:rPr lang="en-US" sz="2400" dirty="0" err="1"/>
+              <a:rPr lang="en-US" sz="2800" dirty="0" err="1"/>
               <a:t>tabela</a:t>
             </a:r>
             <a:r>
-              <a:rPr lang="en-US" sz="2400" dirty="0"/>
+              <a:rPr lang="en-US" sz="2800" dirty="0"/>
               <a:t> </a:t>
             </a:r>
             <a:r>
-              <a:rPr lang="en-US" sz="2400" dirty="0">
+              <a:rPr lang="en-US" sz="2800" dirty="0">
                 <a:solidFill>
                   <a:srgbClr val="7030A0"/>
                 </a:solidFill>
@@ -5895,18 +5895,18 @@
               <a:t>VALUES</a:t>
             </a:r>
             <a:r>
-              <a:rPr lang="en-US" sz="2400" dirty="0"/>
+              <a:rPr lang="en-US" sz="2800" dirty="0"/>
               <a:t> (</a:t>
             </a:r>
             <a:r>
-              <a:rPr lang="en-US" sz="2400" dirty="0" err="1"/>
+              <a:rPr lang="en-US" sz="2800" dirty="0" err="1"/>
               <a:t>valores</a:t>
             </a:r>
             <a:r>
-              <a:rPr lang="en-US" sz="2400" dirty="0"/>
+              <a:rPr lang="en-US" sz="2800" dirty="0"/>
               <a:t>);</a:t>
             </a:r>
-            <a:endParaRPr lang="pt-BR" sz="2400" dirty="0"/>
+            <a:endParaRPr lang="pt-BR" sz="2800" dirty="0"/>
           </a:p>
         </p:txBody>
       </p:sp>
@@ -5932,8 +5932,8 @@
         </p:blipFill>
         <p:spPr>
           <a:xfrm>
-            <a:off x="1285202" y="2184081"/>
-            <a:ext cx="9621593" cy="1028844"/>
+            <a:off x="274851" y="2140417"/>
+            <a:ext cx="11642294" cy="1244919"/>
           </a:xfrm>
           <a:prstGeom prst="rect">
             <a:avLst/>
@@ -5954,8 +5954,8 @@
         </p:nvSpPr>
         <p:spPr>
           <a:xfrm>
-            <a:off x="4721466" y="3559711"/>
-            <a:ext cx="2749064" cy="400110"/>
+            <a:off x="4302365" y="3584361"/>
+            <a:ext cx="3587265" cy="523220"/>
           </a:xfrm>
           <a:prstGeom prst="rect">
             <a:avLst/>
@@ -5969,14 +5969,14 @@
           <a:lstStyle/>
           <a:p>
             <a:r>
-              <a:rPr lang="en-US" sz="2000" dirty="0" err="1"/>
+              <a:rPr lang="en-US" sz="2800" dirty="0" err="1"/>
               <a:t>Visualização</a:t>
             </a:r>
             <a:r>
-              <a:rPr lang="en-US" sz="2000" dirty="0"/>
+              <a:rPr lang="en-US" sz="2800" dirty="0"/>
               <a:t> dos dados:</a:t>
             </a:r>
-            <a:endParaRPr lang="pt-BR" sz="2000" dirty="0"/>
+            <a:endParaRPr lang="pt-BR" sz="2800" dirty="0"/>
           </a:p>
         </p:txBody>
       </p:sp>
@@ -6206,12 +6206,52 @@
           </a:p>
         </p:txBody>
       </p:sp>
+      <p:sp>
+        <p:nvSpPr>
+          <p:cNvPr id="9" name="CaixaDeTexto 8">
+            <a:extLst>
+              <a:ext uri="{FF2B5EF4-FFF2-40B4-BE49-F238E27FC236}">
+                <a16:creationId xmlns:a16="http://schemas.microsoft.com/office/drawing/2014/main" id="{642834AF-4212-476C-6AAD-449DD9A21D6E}"/>
+              </a:ext>
+            </a:extLst>
+          </p:cNvPr>
+          <p:cNvSpPr txBox="1"/>
+          <p:nvPr/>
+        </p:nvSpPr>
+        <p:spPr>
+          <a:xfrm>
+            <a:off x="4297965" y="3623989"/>
+            <a:ext cx="3596057" cy="523220"/>
+          </a:xfrm>
+          <a:prstGeom prst="rect">
+            <a:avLst/>
+          </a:prstGeom>
+          <a:noFill/>
+        </p:spPr>
+        <p:txBody>
+          <a:bodyPr wrap="square" rtlCol="0">
+            <a:spAutoFit/>
+          </a:bodyPr>
+          <a:lstStyle/>
+          <a:p>
+            <a:r>
+              <a:rPr lang="en-US" sz="2800" dirty="0" err="1"/>
+              <a:t>Visualização</a:t>
+            </a:r>
+            <a:r>
+              <a:rPr lang="en-US" sz="2800" dirty="0"/>
+              <a:t> dos dados:</a:t>
+            </a:r>
+            <a:endParaRPr lang="pt-BR" sz="2800" dirty="0"/>
+          </a:p>
+        </p:txBody>
+      </p:sp>
       <p:pic>
         <p:nvPicPr>
-          <p:cNvPr id="8" name="Imagem 7">
-            <a:extLst>
-              <a:ext uri="{FF2B5EF4-FFF2-40B4-BE49-F238E27FC236}">
-                <a16:creationId xmlns:a16="http://schemas.microsoft.com/office/drawing/2014/main" id="{72031B6B-1390-E884-65B1-23A71F20D21A}"/>
+          <p:cNvPr id="11" name="Imagem 10">
+            <a:extLst>
+              <a:ext uri="{FF2B5EF4-FFF2-40B4-BE49-F238E27FC236}">
+                <a16:creationId xmlns:a16="http://schemas.microsoft.com/office/drawing/2014/main" id="{467A3934-E26D-F670-F471-31A6347D310F}"/>
               </a:ext>
             </a:extLst>
           </p:cNvPr>
@@ -6228,60 +6268,20 @@
         </p:blipFill>
         <p:spPr>
           <a:xfrm>
-            <a:off x="1823299" y="2188477"/>
-            <a:ext cx="8545402" cy="826005"/>
+            <a:off x="2683060" y="4446654"/>
+            <a:ext cx="6825873" cy="1789307"/>
           </a:xfrm>
           <a:prstGeom prst="rect">
             <a:avLst/>
           </a:prstGeom>
         </p:spPr>
       </p:pic>
-      <p:sp>
-        <p:nvSpPr>
-          <p:cNvPr id="9" name="CaixaDeTexto 8">
-            <a:extLst>
-              <a:ext uri="{FF2B5EF4-FFF2-40B4-BE49-F238E27FC236}">
-                <a16:creationId xmlns:a16="http://schemas.microsoft.com/office/drawing/2014/main" id="{642834AF-4212-476C-6AAD-449DD9A21D6E}"/>
-              </a:ext>
-            </a:extLst>
-          </p:cNvPr>
-          <p:cNvSpPr txBox="1"/>
-          <p:nvPr/>
-        </p:nvSpPr>
-        <p:spPr>
-          <a:xfrm>
-            <a:off x="4721466" y="3559711"/>
-            <a:ext cx="2749064" cy="400110"/>
-          </a:xfrm>
-          <a:prstGeom prst="rect">
-            <a:avLst/>
-          </a:prstGeom>
-          <a:noFill/>
-        </p:spPr>
-        <p:txBody>
-          <a:bodyPr wrap="square" rtlCol="0">
-            <a:spAutoFit/>
-          </a:bodyPr>
-          <a:lstStyle/>
-          <a:p>
-            <a:r>
-              <a:rPr lang="en-US" sz="2000" dirty="0" err="1"/>
-              <a:t>Visualização</a:t>
-            </a:r>
-            <a:r>
-              <a:rPr lang="en-US" sz="2000" dirty="0"/>
-              <a:t> dos dados:</a:t>
-            </a:r>
-            <a:endParaRPr lang="pt-BR" sz="2000" dirty="0"/>
-          </a:p>
-        </p:txBody>
-      </p:sp>
       <p:pic>
         <p:nvPicPr>
-          <p:cNvPr id="11" name="Imagem 10">
-            <a:extLst>
-              <a:ext uri="{FF2B5EF4-FFF2-40B4-BE49-F238E27FC236}">
-                <a16:creationId xmlns:a16="http://schemas.microsoft.com/office/drawing/2014/main" id="{467A3934-E26D-F670-F471-31A6347D310F}"/>
+          <p:cNvPr id="13" name="Imagem 12">
+            <a:extLst>
+              <a:ext uri="{FF2B5EF4-FFF2-40B4-BE49-F238E27FC236}">
+                <a16:creationId xmlns:a16="http://schemas.microsoft.com/office/drawing/2014/main" id="{8825EBEF-583D-5549-65F1-31EE3CBB39F6}"/>
               </a:ext>
             </a:extLst>
           </p:cNvPr>
@@ -6298,8 +6298,8 @@
         </p:blipFill>
         <p:spPr>
           <a:xfrm>
-            <a:off x="2683060" y="4446654"/>
-            <a:ext cx="6825873" cy="1789307"/>
+            <a:off x="226949" y="6371167"/>
+            <a:ext cx="3559961" cy="486833"/>
           </a:xfrm>
           <a:prstGeom prst="rect">
             <a:avLst/>
@@ -6308,10 +6308,10 @@
       </p:pic>
       <p:pic>
         <p:nvPicPr>
-          <p:cNvPr id="13" name="Imagem 12">
-            <a:extLst>
-              <a:ext uri="{FF2B5EF4-FFF2-40B4-BE49-F238E27FC236}">
-                <a16:creationId xmlns:a16="http://schemas.microsoft.com/office/drawing/2014/main" id="{8825EBEF-583D-5549-65F1-31EE3CBB39F6}"/>
+          <p:cNvPr id="4" name="Imagem 3">
+            <a:extLst>
+              <a:ext uri="{FF2B5EF4-FFF2-40B4-BE49-F238E27FC236}">
+                <a16:creationId xmlns:a16="http://schemas.microsoft.com/office/drawing/2014/main" id="{7D93D7FA-4937-ACC8-81C6-4CE8215501DE}"/>
               </a:ext>
             </a:extLst>
           </p:cNvPr>
@@ -6328,8 +6328,8 @@
         </p:blipFill>
         <p:spPr>
           <a:xfrm>
-            <a:off x="226949" y="6371167"/>
-            <a:ext cx="3559961" cy="486833"/>
+            <a:off x="351618" y="2297153"/>
+            <a:ext cx="11488753" cy="962159"/>
           </a:xfrm>
           <a:prstGeom prst="rect">
             <a:avLst/>
@@ -6456,8 +6456,8 @@
         </p:nvSpPr>
         <p:spPr>
           <a:xfrm>
-            <a:off x="3770628" y="1419590"/>
-            <a:ext cx="4650744" cy="461665"/>
+            <a:off x="3391726" y="1347986"/>
+            <a:ext cx="5408541" cy="523220"/>
           </a:xfrm>
           <a:prstGeom prst="rect">
             <a:avLst/>
@@ -6471,7 +6471,7 @@
           <a:lstStyle/>
           <a:p>
             <a:r>
-              <a:rPr lang="en-US" sz="2400" dirty="0">
+              <a:rPr lang="en-US" sz="2800" dirty="0">
                 <a:solidFill>
                   <a:srgbClr val="7030A0"/>
                 </a:solidFill>
@@ -6479,15 +6479,15 @@
               <a:t>DELETE FROM</a:t>
             </a:r>
             <a:r>
-              <a:rPr lang="en-US" sz="2400" dirty="0"/>
+              <a:rPr lang="en-US" sz="2800" dirty="0"/>
               <a:t> </a:t>
             </a:r>
             <a:r>
-              <a:rPr lang="en-US" sz="2400" dirty="0" err="1"/>
+              <a:rPr lang="en-US" sz="2800" dirty="0" err="1"/>
               <a:t>tabela</a:t>
             </a:r>
             <a:r>
-              <a:rPr lang="en-US" sz="2400" dirty="0">
+              <a:rPr lang="en-US" sz="2800" dirty="0">
                 <a:solidFill>
                   <a:srgbClr val="7030A0"/>
                 </a:solidFill>
@@ -6495,23 +6495,63 @@
               <a:t> WHERE </a:t>
             </a:r>
             <a:r>
-              <a:rPr lang="en-US" sz="2400" dirty="0" err="1"/>
+              <a:rPr lang="en-US" sz="2800" dirty="0" err="1"/>
               <a:t>lógica</a:t>
             </a:r>
             <a:r>
-              <a:rPr lang="en-US" sz="2400" dirty="0"/>
+              <a:rPr lang="en-US" sz="2800" dirty="0"/>
               <a:t>;</a:t>
             </a:r>
-            <a:endParaRPr lang="pt-BR" sz="2400" dirty="0"/>
+            <a:endParaRPr lang="pt-BR" sz="2800" dirty="0"/>
+          </a:p>
+        </p:txBody>
+      </p:sp>
+      <p:sp>
+        <p:nvSpPr>
+          <p:cNvPr id="10" name="CaixaDeTexto 9">
+            <a:extLst>
+              <a:ext uri="{FF2B5EF4-FFF2-40B4-BE49-F238E27FC236}">
+                <a16:creationId xmlns:a16="http://schemas.microsoft.com/office/drawing/2014/main" id="{85E7FA1E-2892-FE59-57E9-5EF37403556B}"/>
+              </a:ext>
+            </a:extLst>
+          </p:cNvPr>
+          <p:cNvSpPr txBox="1"/>
+          <p:nvPr/>
+        </p:nvSpPr>
+        <p:spPr>
+          <a:xfrm>
+            <a:off x="4289175" y="3557339"/>
+            <a:ext cx="3613642" cy="523220"/>
+          </a:xfrm>
+          <a:prstGeom prst="rect">
+            <a:avLst/>
+          </a:prstGeom>
+          <a:noFill/>
+        </p:spPr>
+        <p:txBody>
+          <a:bodyPr wrap="square" rtlCol="0">
+            <a:spAutoFit/>
+          </a:bodyPr>
+          <a:lstStyle/>
+          <a:p>
+            <a:r>
+              <a:rPr lang="en-US" sz="2800" dirty="0" err="1"/>
+              <a:t>Visualização</a:t>
+            </a:r>
+            <a:r>
+              <a:rPr lang="en-US" sz="2800" dirty="0"/>
+              <a:t> dos dados:</a:t>
+            </a:r>
+            <a:endParaRPr lang="pt-BR" sz="2800" dirty="0"/>
           </a:p>
         </p:txBody>
       </p:sp>
       <p:pic>
         <p:nvPicPr>
-          <p:cNvPr id="9" name="Imagem 8">
-            <a:extLst>
-              <a:ext uri="{FF2B5EF4-FFF2-40B4-BE49-F238E27FC236}">
-                <a16:creationId xmlns:a16="http://schemas.microsoft.com/office/drawing/2014/main" id="{3CA44700-F2A2-D74D-A0AA-C71E39022566}"/>
+          <p:cNvPr id="12" name="Imagem 11">
+            <a:extLst>
+              <a:ext uri="{FF2B5EF4-FFF2-40B4-BE49-F238E27FC236}">
+                <a16:creationId xmlns:a16="http://schemas.microsoft.com/office/drawing/2014/main" id="{5330089C-1F5C-B9BB-B6B0-5F5554EAE68D}"/>
               </a:ext>
             </a:extLst>
           </p:cNvPr>
@@ -6528,60 +6568,20 @@
         </p:blipFill>
         <p:spPr>
           <a:xfrm>
-            <a:off x="3185429" y="2370414"/>
-            <a:ext cx="5821138" cy="700138"/>
+            <a:off x="2296553" y="4448980"/>
+            <a:ext cx="7598893" cy="1586176"/>
           </a:xfrm>
           <a:prstGeom prst="rect">
             <a:avLst/>
           </a:prstGeom>
         </p:spPr>
       </p:pic>
-      <p:sp>
-        <p:nvSpPr>
-          <p:cNvPr id="10" name="CaixaDeTexto 9">
-            <a:extLst>
-              <a:ext uri="{FF2B5EF4-FFF2-40B4-BE49-F238E27FC236}">
-                <a16:creationId xmlns:a16="http://schemas.microsoft.com/office/drawing/2014/main" id="{85E7FA1E-2892-FE59-57E9-5EF37403556B}"/>
-              </a:ext>
-            </a:extLst>
-          </p:cNvPr>
-          <p:cNvSpPr txBox="1"/>
-          <p:nvPr/>
-        </p:nvSpPr>
-        <p:spPr>
-          <a:xfrm>
-            <a:off x="4721466" y="3559711"/>
-            <a:ext cx="2749064" cy="400110"/>
-          </a:xfrm>
-          <a:prstGeom prst="rect">
-            <a:avLst/>
-          </a:prstGeom>
-          <a:noFill/>
-        </p:spPr>
-        <p:txBody>
-          <a:bodyPr wrap="square" rtlCol="0">
-            <a:spAutoFit/>
-          </a:bodyPr>
-          <a:lstStyle/>
-          <a:p>
-            <a:r>
-              <a:rPr lang="en-US" sz="2000" dirty="0" err="1"/>
-              <a:t>Visualização</a:t>
-            </a:r>
-            <a:r>
-              <a:rPr lang="en-US" sz="2000" dirty="0"/>
-              <a:t> dos dados:</a:t>
-            </a:r>
-            <a:endParaRPr lang="pt-BR" sz="2000" dirty="0"/>
-          </a:p>
-        </p:txBody>
-      </p:sp>
       <p:pic>
         <p:nvPicPr>
-          <p:cNvPr id="12" name="Imagem 11">
-            <a:extLst>
-              <a:ext uri="{FF2B5EF4-FFF2-40B4-BE49-F238E27FC236}">
-                <a16:creationId xmlns:a16="http://schemas.microsoft.com/office/drawing/2014/main" id="{5330089C-1F5C-B9BB-B6B0-5F5554EAE68D}"/>
+          <p:cNvPr id="3" name="Imagem 2">
+            <a:extLst>
+              <a:ext uri="{FF2B5EF4-FFF2-40B4-BE49-F238E27FC236}">
+                <a16:creationId xmlns:a16="http://schemas.microsoft.com/office/drawing/2014/main" id="{D0070731-9117-8F41-3604-78EF8B71868D}"/>
               </a:ext>
             </a:extLst>
           </p:cNvPr>
@@ -6598,8 +6598,8 @@
         </p:blipFill>
         <p:spPr>
           <a:xfrm>
-            <a:off x="2296553" y="4448980"/>
-            <a:ext cx="7598893" cy="1586176"/>
+            <a:off x="1775807" y="2352829"/>
+            <a:ext cx="8640381" cy="609685"/>
           </a:xfrm>
           <a:prstGeom prst="rect">
             <a:avLst/>
@@ -6820,8 +6820,8 @@
         </p:nvSpPr>
         <p:spPr>
           <a:xfrm>
-            <a:off x="5627077" y="1125416"/>
-            <a:ext cx="937846" cy="461665"/>
+            <a:off x="4002696" y="1182497"/>
+            <a:ext cx="4186606" cy="523220"/>
           </a:xfrm>
           <a:prstGeom prst="rect">
             <a:avLst/>
@@ -6835,10 +6835,14 @@
           <a:lstStyle/>
           <a:p>
             <a:r>
-              <a:rPr lang="en-US" sz="2400" dirty="0"/>
+              <a:rPr lang="en-US" sz="2800" dirty="0" err="1"/>
               <a:t>Busca</a:t>
             </a:r>
-            <a:endParaRPr lang="pt-BR" sz="2400" dirty="0"/>
+            <a:r>
+              <a:rPr lang="en-US" sz="2800" dirty="0"/>
+              <a:t> / Consulta dos Dados</a:t>
+            </a:r>
+            <a:endParaRPr lang="pt-BR" sz="2800" dirty="0"/>
           </a:p>
         </p:txBody>
       </p:sp>
@@ -7080,10 +7084,10 @@
       </p:pic>
       <p:pic>
         <p:nvPicPr>
-          <p:cNvPr id="9" name="Imagem 8">
-            <a:extLst>
-              <a:ext uri="{FF2B5EF4-FFF2-40B4-BE49-F238E27FC236}">
-                <a16:creationId xmlns:a16="http://schemas.microsoft.com/office/drawing/2014/main" id="{E0D3816B-2DAA-E417-F88C-6CE126C39CF0}"/>
+          <p:cNvPr id="7" name="Imagem 6" descr="Uma imagem contendo Ícone&#10;&#10;O conteúdo gerado por IA pode estar incorreto.">
+            <a:extLst>
+              <a:ext uri="{FF2B5EF4-FFF2-40B4-BE49-F238E27FC236}">
+                <a16:creationId xmlns:a16="http://schemas.microsoft.com/office/drawing/2014/main" id="{6BA7E1F0-BD1E-D6E4-AEA5-0998B0C3B446}"/>
               </a:ext>
             </a:extLst>
           </p:cNvPr>
@@ -7100,14 +7104,58 @@
         </p:blipFill>
         <p:spPr>
           <a:xfrm>
-            <a:off x="3376622" y="2622916"/>
-            <a:ext cx="5438753" cy="753421"/>
+            <a:off x="1772007" y="2360939"/>
+            <a:ext cx="8647984" cy="1094682"/>
           </a:xfrm>
           <a:prstGeom prst="rect">
             <a:avLst/>
           </a:prstGeom>
         </p:spPr>
       </p:pic>
+      <p:cxnSp>
+        <p:nvCxnSpPr>
+          <p:cNvPr id="10" name="Conector: Curvo 9">
+            <a:extLst>
+              <a:ext uri="{FF2B5EF4-FFF2-40B4-BE49-F238E27FC236}">
+                <a16:creationId xmlns:a16="http://schemas.microsoft.com/office/drawing/2014/main" id="{5F3203F5-CCC8-7703-EF03-778065FE5587}"/>
+              </a:ext>
+            </a:extLst>
+          </p:cNvPr>
+          <p:cNvCxnSpPr>
+            <a:cxnSpLocks/>
+          </p:cNvCxnSpPr>
+          <p:nvPr/>
+        </p:nvCxnSpPr>
+        <p:spPr>
+          <a:xfrm rot="5400000" flipH="1" flipV="1">
+            <a:off x="4375078" y="1845551"/>
+            <a:ext cx="719158" cy="677007"/>
+          </a:xfrm>
+          <a:prstGeom prst="curvedConnector3">
+            <a:avLst>
+              <a:gd name="adj1" fmla="val 53668"/>
+            </a:avLst>
+          </a:prstGeom>
+          <a:ln>
+            <a:headEnd type="triangle"/>
+            <a:tailEnd type="triangle"/>
+          </a:ln>
+        </p:spPr>
+        <p:style>
+          <a:lnRef idx="1">
+            <a:schemeClr val="dk1"/>
+          </a:lnRef>
+          <a:fillRef idx="0">
+            <a:schemeClr val="dk1"/>
+          </a:fillRef>
+          <a:effectRef idx="0">
+            <a:schemeClr val="dk1"/>
+          </a:effectRef>
+          <a:fontRef idx="minor">
+            <a:schemeClr val="tx1"/>
+          </a:fontRef>
+        </p:style>
+      </p:cxnSp>
     </p:spTree>
     <p:extLst>
       <p:ext uri="{BB962C8B-B14F-4D97-AF65-F5344CB8AC3E}">
@@ -7230,8 +7278,8 @@
         </p:nvSpPr>
         <p:spPr>
           <a:xfrm>
-            <a:off x="2730010" y="1380393"/>
-            <a:ext cx="6731978" cy="461665"/>
+            <a:off x="2211996" y="1349615"/>
+            <a:ext cx="7768005" cy="523220"/>
           </a:xfrm>
           <a:prstGeom prst="rect">
             <a:avLst/>
@@ -7245,51 +7293,51 @@
           <a:lstStyle/>
           <a:p>
             <a:r>
-              <a:rPr lang="en-US" sz="2400" dirty="0" err="1"/>
+              <a:rPr lang="en-US" sz="2800" dirty="0" err="1"/>
               <a:t>Buscando</a:t>
             </a:r>
             <a:r>
-              <a:rPr lang="en-US" sz="2400" dirty="0"/>
+              <a:rPr lang="en-US" sz="2800" dirty="0"/>
               <a:t> </a:t>
             </a:r>
             <a:r>
-              <a:rPr lang="en-US" sz="2400" dirty="0" err="1"/>
+              <a:rPr lang="en-US" sz="2800" dirty="0" err="1"/>
               <a:t>parte</a:t>
             </a:r>
             <a:r>
-              <a:rPr lang="en-US" sz="2400" dirty="0"/>
+              <a:rPr lang="en-US" sz="2800" dirty="0"/>
               <a:t> dos dados de </a:t>
             </a:r>
             <a:r>
-              <a:rPr lang="en-US" sz="2400" dirty="0" err="1"/>
+              <a:rPr lang="en-US" sz="2800" dirty="0" err="1"/>
               <a:t>uma</a:t>
             </a:r>
             <a:r>
-              <a:rPr lang="en-US" sz="2400" dirty="0"/>
+              <a:rPr lang="en-US" sz="2800" dirty="0"/>
               <a:t> </a:t>
             </a:r>
             <a:r>
-              <a:rPr lang="en-US" sz="2400" dirty="0" err="1"/>
+              <a:rPr lang="en-US" sz="2800" dirty="0" err="1"/>
               <a:t>tabela</a:t>
             </a:r>
             <a:r>
-              <a:rPr lang="en-US" sz="2400" dirty="0"/>
+              <a:rPr lang="en-US" sz="2800" dirty="0"/>
               <a:t> com </a:t>
             </a:r>
             <a:r>
-              <a:rPr lang="en-US" sz="2400" dirty="0" err="1"/>
+              <a:rPr lang="en-US" sz="2800" dirty="0" err="1"/>
               <a:t>lógica</a:t>
             </a:r>
-            <a:endParaRPr lang="pt-BR" sz="2400" dirty="0"/>
+            <a:endParaRPr lang="pt-BR" sz="2800" dirty="0"/>
           </a:p>
         </p:txBody>
       </p:sp>
       <p:pic>
         <p:nvPicPr>
-          <p:cNvPr id="6" name="Imagem 5">
-            <a:extLst>
-              <a:ext uri="{FF2B5EF4-FFF2-40B4-BE49-F238E27FC236}">
-                <a16:creationId xmlns:a16="http://schemas.microsoft.com/office/drawing/2014/main" id="{4E23701D-AE44-D542-4595-C07F7AF55725}"/>
+          <p:cNvPr id="8" name="Imagem 7">
+            <a:extLst>
+              <a:ext uri="{FF2B5EF4-FFF2-40B4-BE49-F238E27FC236}">
+                <a16:creationId xmlns:a16="http://schemas.microsoft.com/office/drawing/2014/main" id="{9AE46E51-0AFF-2DC0-8B12-A0E856658682}"/>
               </a:ext>
             </a:extLst>
           </p:cNvPr>
@@ -7306,8 +7354,8 @@
         </p:blipFill>
         <p:spPr>
           <a:xfrm>
-            <a:off x="1765917" y="2396108"/>
-            <a:ext cx="8660166" cy="461664"/>
+            <a:off x="3128995" y="3745930"/>
+            <a:ext cx="5934008" cy="1942694"/>
           </a:xfrm>
           <a:prstGeom prst="rect">
             <a:avLst/>
@@ -7316,10 +7364,10 @@
       </p:pic>
       <p:pic>
         <p:nvPicPr>
-          <p:cNvPr id="8" name="Imagem 7">
-            <a:extLst>
-              <a:ext uri="{FF2B5EF4-FFF2-40B4-BE49-F238E27FC236}">
-                <a16:creationId xmlns:a16="http://schemas.microsoft.com/office/drawing/2014/main" id="{9AE46E51-0AFF-2DC0-8B12-A0E856658682}"/>
+          <p:cNvPr id="7" name="Imagem 6">
+            <a:extLst>
+              <a:ext uri="{FF2B5EF4-FFF2-40B4-BE49-F238E27FC236}">
+                <a16:creationId xmlns:a16="http://schemas.microsoft.com/office/drawing/2014/main" id="{5E5E58CB-DA6D-0274-313C-D9B117203CAF}"/>
               </a:ext>
             </a:extLst>
           </p:cNvPr>
@@ -7336,8 +7384,8 @@
         </p:blipFill>
         <p:spPr>
           <a:xfrm>
-            <a:off x="3128995" y="3745930"/>
-            <a:ext cx="5934008" cy="1942694"/>
+            <a:off x="599307" y="2396109"/>
+            <a:ext cx="10993384" cy="533474"/>
           </a:xfrm>
           <a:prstGeom prst="rect">
             <a:avLst/>

</xml_diff>